<commit_message>
PPT wiith Android slide
</commit_message>
<xml_diff>
--- a/PPT slides/login page templates.pptx
+++ b/PPT slides/login page templates.pptx
@@ -12,6 +12,7 @@
     <p:sldId id="258" r:id="rId6"/>
     <p:sldId id="262" r:id="rId7"/>
     <p:sldId id="261" r:id="rId8"/>
+    <p:sldId id="263" r:id="rId9"/>
   </p:sldIdLst>
   <p:sldSz cx="12192000" cy="6858000"/>
   <p:notesSz cx="6858000" cy="9144000"/>
@@ -8134,6 +8135,181 @@
 </p:sld>
 </file>
 
+<file path=ppt/slides/slide8.xml><?xml version="1.0" encoding="utf-8"?>
+<p:sld xmlns:a="http://schemas.openxmlformats.org/drawingml/2006/main" xmlns:r="http://schemas.openxmlformats.org/officeDocument/2006/relationships" xmlns:p="http://schemas.openxmlformats.org/presentationml/2006/main">
+  <p:cSld>
+    <p:spTree>
+      <p:nvGrpSpPr>
+        <p:cNvPr id="1" name=""/>
+        <p:cNvGrpSpPr/>
+        <p:nvPr/>
+      </p:nvGrpSpPr>
+      <p:grpSpPr>
+        <a:xfrm>
+          <a:off x="0" y="0"/>
+          <a:ext cx="0" cy="0"/>
+          <a:chOff x="0" y="0"/>
+          <a:chExt cx="0" cy="0"/>
+        </a:xfrm>
+      </p:grpSpPr>
+      <p:sp>
+        <p:nvSpPr>
+          <p:cNvPr id="2" name="TextBox 1"/>
+          <p:cNvSpPr txBox="1"/>
+          <p:nvPr/>
+        </p:nvSpPr>
+        <p:spPr>
+          <a:xfrm>
+            <a:off x="3139976" y="387831"/>
+            <a:ext cx="5886743" cy="523220"/>
+          </a:xfrm>
+          <a:prstGeom prst="rect">
+            <a:avLst/>
+          </a:prstGeom>
+          <a:noFill/>
+        </p:spPr>
+        <p:txBody>
+          <a:bodyPr wrap="square" rtlCol="0">
+            <a:spAutoFit/>
+          </a:bodyPr>
+          <a:lstStyle/>
+          <a:p>
+            <a:pPr algn="ctr"/>
+            <a:r>
+              <a:rPr lang="en-IN" sz="2800" b="1" dirty="0">
+                <a:latin typeface="Times New Roman" panose="02020603050405020304" pitchFamily="18" charset="0"/>
+                <a:cs typeface="Times New Roman" panose="02020603050405020304" pitchFamily="18" charset="0"/>
+              </a:rPr>
+              <a:t>ANDROID APP</a:t>
+            </a:r>
+          </a:p>
+        </p:txBody>
+      </p:sp>
+      <p:pic>
+        <p:nvPicPr>
+          <p:cNvPr id="3" name="Picture 2"/>
+          <p:cNvPicPr>
+            <a:picLocks noChangeAspect="1"/>
+          </p:cNvPicPr>
+          <p:nvPr/>
+        </p:nvPicPr>
+        <p:blipFill>
+          <a:blip r:embed="rId2">
+            <a:extLst>
+              <a:ext uri="{28A0092B-C50C-407E-A947-70E740481C1C}">
+                <a14:useLocalDpi xmlns:a14="http://schemas.microsoft.com/office/drawing/2010/main" val="0"/>
+              </a:ext>
+            </a:extLst>
+          </a:blip>
+          <a:stretch>
+            <a:fillRect/>
+          </a:stretch>
+        </p:blipFill>
+        <p:spPr>
+          <a:xfrm>
+            <a:off x="2329937" y="1007165"/>
+            <a:ext cx="3130826" cy="5565913"/>
+          </a:xfrm>
+          <a:prstGeom prst="roundRect">
+            <a:avLst>
+              <a:gd name="adj" fmla="val 16667"/>
+            </a:avLst>
+          </a:prstGeom>
+          <a:ln>
+            <a:solidFill>
+              <a:schemeClr val="tx1"/>
+            </a:solidFill>
+          </a:ln>
+          <a:effectLst>
+            <a:outerShdw blurRad="76200" dist="38100" dir="7800000" algn="tl" rotWithShape="0">
+              <a:srgbClr val="000000">
+                <a:alpha val="40000"/>
+              </a:srgbClr>
+            </a:outerShdw>
+          </a:effectLst>
+          <a:scene3d>
+            <a:camera prst="orthographicFront"/>
+            <a:lightRig rig="contrasting" dir="t">
+              <a:rot lat="0" lon="0" rev="4200000"/>
+            </a:lightRig>
+          </a:scene3d>
+          <a:sp3d prstMaterial="plastic">
+            <a:bevelT w="381000" h="114300" prst="relaxedInset"/>
+            <a:contourClr>
+              <a:srgbClr val="969696"/>
+            </a:contourClr>
+          </a:sp3d>
+        </p:spPr>
+      </p:pic>
+      <p:pic>
+        <p:nvPicPr>
+          <p:cNvPr id="4" name="Picture 3"/>
+          <p:cNvPicPr>
+            <a:picLocks noChangeAspect="1"/>
+          </p:cNvPicPr>
+          <p:nvPr/>
+        </p:nvPicPr>
+        <p:blipFill>
+          <a:blip r:embed="rId3">
+            <a:extLst>
+              <a:ext uri="{28A0092B-C50C-407E-A947-70E740481C1C}">
+                <a14:useLocalDpi xmlns:a14="http://schemas.microsoft.com/office/drawing/2010/main" val="0"/>
+              </a:ext>
+            </a:extLst>
+          </a:blip>
+          <a:stretch>
+            <a:fillRect/>
+          </a:stretch>
+        </p:blipFill>
+        <p:spPr>
+          <a:xfrm>
+            <a:off x="6789960" y="1007165"/>
+            <a:ext cx="3104198" cy="5518575"/>
+          </a:xfrm>
+          <a:prstGeom prst="roundRect">
+            <a:avLst>
+              <a:gd name="adj" fmla="val 16667"/>
+            </a:avLst>
+          </a:prstGeom>
+          <a:ln>
+            <a:solidFill>
+              <a:schemeClr val="tx1"/>
+            </a:solidFill>
+          </a:ln>
+          <a:effectLst>
+            <a:outerShdw blurRad="76200" dist="38100" dir="7800000" algn="tl" rotWithShape="0">
+              <a:srgbClr val="000000">
+                <a:alpha val="40000"/>
+              </a:srgbClr>
+            </a:outerShdw>
+          </a:effectLst>
+          <a:scene3d>
+            <a:camera prst="orthographicFront"/>
+            <a:lightRig rig="contrasting" dir="t">
+              <a:rot lat="0" lon="0" rev="4200000"/>
+            </a:lightRig>
+          </a:scene3d>
+          <a:sp3d prstMaterial="plastic">
+            <a:bevelT w="381000" h="114300" prst="relaxedInset"/>
+            <a:contourClr>
+              <a:srgbClr val="969696"/>
+            </a:contourClr>
+          </a:sp3d>
+        </p:spPr>
+      </p:pic>
+    </p:spTree>
+    <p:extLst>
+      <p:ext uri="{BB962C8B-B14F-4D97-AF65-F5344CB8AC3E}">
+        <p14:creationId xmlns:p14="http://schemas.microsoft.com/office/powerpoint/2010/main" val="1391308729"/>
+      </p:ext>
+    </p:extLst>
+  </p:cSld>
+  <p:clrMapOvr>
+    <a:masterClrMapping/>
+  </p:clrMapOvr>
+</p:sld>
+</file>
+
 <file path=ppt/theme/theme1.xml><?xml version="1.0" encoding="utf-8"?>
 <a:theme xmlns:a="http://schemas.openxmlformats.org/drawingml/2006/main" name="Office Theme">
   <a:themeElements>

</xml_diff>